<commit_message>
Added github repo to resources slide
</commit_message>
<xml_diff>
--- a/2017-June-WVSE.pptx
+++ b/2017-June-WVSE.pptx
@@ -179,6 +179,10 @@
     </p:ext>
   </p:extLst>
 </p:presentation>
+</file>
+
+<file path=ppt/revisionInfo.xml><?xml version="1.0" encoding="utf-8"?>
+<p1510:revInfo xmlns:a="http://schemas.openxmlformats.org/drawingml/2006/main" xmlns:r="http://schemas.openxmlformats.org/officeDocument/2006/relationships" xmlns:p1510="http://schemas.microsoft.com/office/powerpoint/2015/10/main"/>
 </file>
 
 <file path=ppt/diagrams/colors1.xml><?xml version="1.0" encoding="utf-8"?>
@@ -2746,7 +2750,7 @@
           <a:p>
             <a:fld id="{85B84C55-34AB-4F04-8C6E-103378987567}" type="datetimeFigureOut">
               <a:rPr lang="en-US" smtClean="0"/>
-              <a:t>5/31/2017</a:t>
+              <a:t>6/1/2017</a:t>
             </a:fld>
             <a:endParaRPr lang="en-US" dirty="0"/>
           </a:p>
@@ -2911,7 +2915,7 @@
           <a:p>
             <a:fld id="{86832DD9-7C6A-4C91-8CF1-0788B8213502}" type="datetimeFigureOut">
               <a:rPr lang="en-US" smtClean="0"/>
-              <a:t>5/31/2017</a:t>
+              <a:t>6/1/2017</a:t>
             </a:fld>
             <a:endParaRPr lang="en-US" dirty="0"/>
           </a:p>
@@ -3884,7 +3888,7 @@
           <a:p>
             <a:fld id="{8A57DA2E-A198-42B8-A77A-6063A9DC8646}" type="datetime1">
               <a:rPr lang="en-US" smtClean="0"/>
-              <a:t>5/31/2017</a:t>
+              <a:t>6/1/2017</a:t>
             </a:fld>
             <a:endParaRPr lang="en-US" dirty="0"/>
           </a:p>
@@ -4298,7 +4302,7 @@
           <a:p>
             <a:fld id="{5D0B467C-85F7-469C-B16D-CF41F04F5F22}" type="datetime1">
               <a:rPr lang="en-US" smtClean="0"/>
-              <a:t>5/31/2017</a:t>
+              <a:t>6/1/2017</a:t>
             </a:fld>
             <a:endParaRPr lang="en-US" dirty="0"/>
           </a:p>
@@ -4479,7 +4483,7 @@
           <a:p>
             <a:fld id="{38E79436-BD82-44D9-9B6F-6D45FC4FB282}" type="datetime1">
               <a:rPr lang="en-US" smtClean="0"/>
-              <a:t>5/31/2017</a:t>
+              <a:t>6/1/2017</a:t>
             </a:fld>
             <a:endParaRPr lang="en-US" dirty="0"/>
           </a:p>
@@ -4670,7 +4674,7 @@
           <a:p>
             <a:fld id="{6955B0D3-E9C4-4790-9AFC-472238E9D978}" type="datetime1">
               <a:rPr lang="en-US" smtClean="0"/>
-              <a:t>5/31/2017</a:t>
+              <a:t>6/1/2017</a:t>
             </a:fld>
             <a:endParaRPr lang="en-US" dirty="0"/>
           </a:p>
@@ -4855,7 +4859,7 @@
           <a:p>
             <a:fld id="{A9EFB39F-05CF-4198-9763-0EA4BE92E0D0}" type="datetime1">
               <a:rPr lang="en-US" smtClean="0"/>
-              <a:t>5/31/2017</a:t>
+              <a:t>6/1/2017</a:t>
             </a:fld>
             <a:endParaRPr lang="en-US" dirty="0"/>
           </a:p>
@@ -5092,7 +5096,7 @@
           <a:p>
             <a:fld id="{FF2491D0-1B86-4F30-8D90-913BBBB0A4F2}" type="datetime1">
               <a:rPr lang="en-US" smtClean="0"/>
-              <a:t>5/31/2017</a:t>
+              <a:t>6/1/2017</a:t>
             </a:fld>
             <a:endParaRPr lang="en-US" dirty="0"/>
           </a:p>
@@ -5372,7 +5376,7 @@
           <a:p>
             <a:fld id="{A28FD5D4-22BE-49CA-89DE-DEB7778B4EA0}" type="datetime1">
               <a:rPr lang="en-US" smtClean="0"/>
-              <a:t>5/31/2017</a:t>
+              <a:t>6/1/2017</a:t>
             </a:fld>
             <a:endParaRPr lang="en-US" dirty="0"/>
           </a:p>
@@ -5762,7 +5766,7 @@
           <a:p>
             <a:fld id="{98A942CB-856E-4E4B-8C89-197AEAE66A5F}" type="datetime1">
               <a:rPr lang="en-US" smtClean="0"/>
-              <a:t>5/31/2017</a:t>
+              <a:t>6/1/2017</a:t>
             </a:fld>
             <a:endParaRPr lang="en-US" dirty="0"/>
           </a:p>
@@ -5900,7 +5904,7 @@
           <a:p>
             <a:fld id="{90C5A565-20AE-4CD1-A4DD-E062216372E9}" type="datetime1">
               <a:rPr lang="en-US" smtClean="0"/>
-              <a:t>5/31/2017</a:t>
+              <a:t>6/1/2017</a:t>
             </a:fld>
             <a:endParaRPr lang="en-US" dirty="0"/>
           </a:p>
@@ -6080,7 +6084,7 @@
           <a:p>
             <a:fld id="{43669077-B497-459B-927D-21898BE78E1B}" type="datetime1">
               <a:rPr lang="en-US" smtClean="0"/>
-              <a:t>5/31/2017</a:t>
+              <a:t>6/1/2017</a:t>
             </a:fld>
             <a:endParaRPr lang="en-US" dirty="0"/>
           </a:p>
@@ -6350,7 +6354,7 @@
           <a:p>
             <a:fld id="{E5371151-446F-4595-B3D3-21EF3A6E9BFE}" type="datetime1">
               <a:rPr lang="en-US" smtClean="0"/>
-              <a:t>5/31/2017</a:t>
+              <a:t>6/1/2017</a:t>
             </a:fld>
             <a:endParaRPr lang="en-US" dirty="0"/>
           </a:p>
@@ -6664,7 +6668,7 @@
           <a:p>
             <a:fld id="{671E04DB-BE65-47F8-B877-7DBE6DFA71B8}" type="datetime1">
               <a:rPr lang="en-US" smtClean="0"/>
-              <a:t>5/31/2017</a:t>
+              <a:t>6/1/2017</a:t>
             </a:fld>
             <a:endParaRPr lang="en-US" dirty="0"/>
           </a:p>
@@ -10870,14 +10874,19 @@
         <p:spPr/>
         <p:txBody>
           <a:bodyPr>
-            <a:normAutofit lnSpcReduction="10000"/>
+            <a:normAutofit/>
           </a:bodyPr>
           <a:lstStyle/>
           <a:p>
             <a:r>
               <a:rPr lang="en-US" dirty="0"/>
-              <a:t>leastprivilege.com/2016/08/21/why-does-my-authorize-attribute-not-work/</a:t>
-            </a:r>
+              <a:t>whoiskevinrich.com/</a:t>
+            </a:r>
+            <a:r>
+              <a:rPr lang="en-US" dirty="0" err="1"/>
+              <a:t>wvse</a:t>
+            </a:r>
+            <a:endParaRPr lang="en-US" dirty="0"/>
           </a:p>
           <a:p>
             <a:r>
@@ -10904,24 +10913,6 @@
               <a:rPr lang="en-US" dirty="0"/>
               <a:t> [2016] (Chapter 2: Identity Protocols and Application Types)</a:t>
             </a:r>
-          </a:p>
-          <a:p>
-            <a:r>
-              <a:rPr lang="en-US" dirty="0"/>
-              <a:t>Google</a:t>
-            </a:r>
-          </a:p>
-          <a:p>
-            <a:r>
-              <a:rPr lang="en-US" dirty="0"/>
-              <a:t>Stack Overflow</a:t>
-            </a:r>
-          </a:p>
-          <a:p>
-            <a:pPr marL="448056" lvl="1" indent="0">
-              <a:buNone/>
-            </a:pPr>
-            <a:endParaRPr lang="en-US" dirty="0"/>
           </a:p>
           <a:p>
             <a:endParaRPr lang="en-US" dirty="0"/>
@@ -12557,7 +12548,7 @@
           <p:nvPr/>
         </p:nvPicPr>
         <p:blipFill>
-          <a:blip r:embed="rId4">
+          <a:blip r:embed="rId4" cstate="print">
             <a:extLst>
               <a:ext uri="{28A0092B-C50C-407E-A947-70E740481C1C}">
                 <a14:useLocalDpi xmlns:a14="http://schemas.microsoft.com/office/drawing/2010/main" val="0"/>

</xml_diff>

<commit_message>
Updated URL for Github location in slide
</commit_message>
<xml_diff>
--- a/2017-June-WVSE.pptx
+++ b/2017-June-WVSE.pptx
@@ -10880,13 +10880,8 @@
           <a:p>
             <a:r>
               <a:rPr lang="en-US" dirty="0"/>
-              <a:t>whoiskevinrich.com/</a:t>
-            </a:r>
-            <a:r>
-              <a:rPr lang="en-US" dirty="0" err="1"/>
-              <a:t>wvse</a:t>
-            </a:r>
-            <a:endParaRPr lang="en-US" dirty="0"/>
+              <a:t>whoiskevinrich.com/choosing-your-identity-server</a:t>
+            </a:r>
           </a:p>
           <a:p>
             <a:r>

</xml_diff>